<commit_message>
Added JavaScript and .yml
Try to test Travis CI
</commit_message>
<xml_diff>
--- a/SS2017_Git_2017-04-27_Nina-Stodolka_Johannes-Struzek.pptx
+++ b/SS2017_Git_2017-04-27_Nina-Stodolka_Johannes-Struzek.pptx
@@ -13150,11 +13150,7 @@
             </a:r>
             <a:r>
               <a:rPr lang="de-DE" smtClean="0"/>
-              <a:t>durch </a:t>
-            </a:r>
-            <a:r>
-              <a:rPr lang="de-DE" smtClean="0"/>
-              <a:t>Linus </a:t>
+              <a:t>durch Linus </a:t>
             </a:r>
             <a:r>
               <a:rPr lang="de-DE" dirty="0" err="1" smtClean="0"/>
@@ -27958,7 +27954,15 @@
             </a:pPr>
             <a:r>
               <a:rPr lang="de-DE" dirty="0" smtClean="0"/>
-              <a:t>Vor Integration: Durchlaufen von definierten Tests, bspw. Statischen Code-Überprüfungen -&gt; automatisierte Übersetzung notwendig</a:t>
+              <a:t>Vor Integration: Durchlaufen von definierten Tests, bspw. </a:t>
+            </a:r>
+            <a:r>
+              <a:rPr lang="de-DE" dirty="0" smtClean="0"/>
+              <a:t>statische </a:t>
+            </a:r>
+            <a:r>
+              <a:rPr lang="de-DE" dirty="0" smtClean="0"/>
+              <a:t>Code-Überprüfungen -&gt; automatisierte Übersetzung notwendig</a:t>
             </a:r>
           </a:p>
           <a:p>
@@ -31387,7 +31391,19 @@
             </a:pPr>
             <a:r>
               <a:rPr lang="de-DE" dirty="0" smtClean="0"/>
-              <a:t>Bspw. 1 Mal täglich mindestens</a:t>
+              <a:t>Bspw. </a:t>
+            </a:r>
+            <a:r>
+              <a:rPr lang="de-DE" dirty="0"/>
+              <a:t>mindestens 1 </a:t>
+            </a:r>
+            <a:r>
+              <a:rPr lang="de-DE" smtClean="0"/>
+              <a:t>Mal </a:t>
+            </a:r>
+            <a:r>
+              <a:rPr lang="de-DE" smtClean="0"/>
+              <a:t>täglich</a:t>
             </a:r>
             <a:endParaRPr lang="de-DE" dirty="0"/>
           </a:p>

</xml_diff>